<commit_message>
Updated lab links, added plaintext version of linkable content.
</commit_message>
<xml_diff>
--- a/hands-on-with-smart-authorization-lab.pptx
+++ b/hands-on-with-smart-authorization-lab.pptx
@@ -309,7 +309,7 @@
       </p14:sectionLst>
     </p:ext>
     <p:ext uri="{EFAFB233-063F-42B5-8137-9DF3F51BA10A}">
-      <p15:sldGuideLst xmlns:p15="http://schemas.microsoft.com/office/powerpoint/2012/main" xmlns="">
+      <p15:sldGuideLst xmlns="" xmlns:p15="http://schemas.microsoft.com/office/powerpoint/2012/main">
         <p15:guide id="1" orient="horz" pos="2162" userDrawn="1">
           <p15:clr>
             <a:srgbClr val="A4A3A4"/>
@@ -383,7 +383,7 @@
       </p15:sldGuideLst>
     </p:ext>
     <p:ext uri="{2D200454-40CA-4A62-9FC3-DE9A4176ACB9}">
-      <p15:notesGuideLst xmlns:p15="http://schemas.microsoft.com/office/powerpoint/2012/main" xmlns="">
+      <p15:notesGuideLst xmlns="" xmlns:p15="http://schemas.microsoft.com/office/powerpoint/2012/main">
         <p15:guide id="1" orient="horz" pos="2208">
           <p15:clr>
             <a:srgbClr val="A4A3A4"/>
@@ -10472,7 +10472,7 @@
         <p:spPr>
           <a:xfrm>
             <a:off x="1609344" y="548642"/>
-            <a:ext cx="9107424" cy="6740307"/>
+            <a:ext cx="9107424" cy="7294305"/>
           </a:xfrm>
           <a:prstGeom prst="rect">
             <a:avLst/>
@@ -10623,32 +10623,53 @@
                 </a:solidFill>
                 <a:latin typeface="+mn-lt"/>
               </a:rPr>
-              <a:t>A copy of this presentation (</a:t>
-            </a:r>
-            <a:r>
-              <a:rPr lang="en-US" b="0" dirty="0" err="1" smtClean="0">
-                <a:solidFill>
-                  <a:schemeClr val="accent3"/>
-                </a:solidFill>
-                <a:latin typeface="+mn-lt"/>
-              </a:rPr>
-              <a:t>bitly</a:t>
-            </a:r>
-            <a:r>
-              <a:rPr lang="en-US" b="0" smtClean="0">
-                <a:solidFill>
-                  <a:schemeClr val="accent3"/>
-                </a:solidFill>
-                <a:latin typeface="+mn-lt"/>
-              </a:rPr>
-              <a:t> link)</a:t>
-            </a:r>
-            <a:endParaRPr lang="en-US" b="0" dirty="0" smtClean="0">
-              <a:solidFill>
-                <a:schemeClr val="accent3"/>
-              </a:solidFill>
-              <a:latin typeface="+mn-lt"/>
-            </a:endParaRPr>
+              <a:t>A copy of this presentation: </a:t>
+            </a:r>
+          </a:p>
+          <a:p>
+            <a:pPr marL="1028700" lvl="1" indent="-571500">
+              <a:buFont typeface="Arial" panose="020B0604020202020204" pitchFamily="34" charset="0"/>
+              <a:buChar char="•"/>
+            </a:pPr>
+            <a:r>
+              <a:rPr lang="en-US" b="0" dirty="0" smtClean="0">
+                <a:solidFill>
+                  <a:schemeClr val="accent3"/>
+                </a:solidFill>
+                <a:latin typeface="+mn-lt"/>
+                <a:hlinkClick r:id="rId2"/>
+              </a:rPr>
+              <a:t>http</a:t>
+            </a:r>
+            <a:r>
+              <a:rPr lang="en-US" b="0" dirty="0">
+                <a:solidFill>
+                  <a:schemeClr val="accent3"/>
+                </a:solidFill>
+                <a:latin typeface="+mn-lt"/>
+                <a:hlinkClick r:id="rId2"/>
+              </a:rPr>
+              <a:t>://</a:t>
+            </a:r>
+            <a:r>
+              <a:rPr lang="en-US" b="0" dirty="0" smtClean="0">
+                <a:solidFill>
+                  <a:schemeClr val="accent3"/>
+                </a:solidFill>
+                <a:latin typeface="+mn-lt"/>
+                <a:hlinkClick r:id="rId2"/>
+              </a:rPr>
+              <a:t>bit.ly/2eBBDsG</a:t>
+            </a:r>
+            <a:r>
+              <a:rPr lang="en-US" b="0" dirty="0" smtClean="0">
+                <a:solidFill>
+                  <a:schemeClr val="accent3"/>
+                </a:solidFill>
+                <a:latin typeface="+mn-lt"/>
+              </a:rPr>
+              <a:t> </a:t>
+            </a:r>
           </a:p>
           <a:p>
             <a:endParaRPr lang="en-US" b="0" dirty="0" smtClean="0">
@@ -16674,22 +16695,25 @@
               </a:rPr>
             </a:br>
             <a:r>
-              <a:rPr lang="en-US" dirty="0">
+              <a:rPr lang="en-US">
                 <a:latin typeface="+mn-lt"/>
               </a:rPr>
               <a:t/>
             </a:r>
             <a:br>
-              <a:rPr lang="en-US" dirty="0">
+              <a:rPr lang="en-US">
                 <a:latin typeface="+mn-lt"/>
               </a:rPr>
             </a:br>
             <a:r>
-              <a:rPr lang="en-US" dirty="0">
-                <a:latin typeface="+mn-lt"/>
-              </a:rPr>
-              <a:t>http://bit.ly/2eZKmRw</a:t>
-            </a:r>
+              <a:rPr lang="en-US">
+                <a:latin typeface="+mn-lt"/>
+              </a:rPr>
+              <a:t>http://bit.ly/2f0GBOc</a:t>
+            </a:r>
+            <a:endParaRPr lang="en-US" dirty="0">
+              <a:latin typeface="+mn-lt"/>
+            </a:endParaRPr>
           </a:p>
         </p:txBody>
       </p:sp>
@@ -21033,7 +21057,7 @@
   <a:extraClrSchemeLst/>
   <a:extLst>
     <a:ext uri="{05A4C25C-085E-4340-85A3-A5531E510DB2}">
-      <thm15:themeFamily xmlns:thm15="http://schemas.microsoft.com/office/thememl/2012/main" xmlns="" name="Cerner_Template_3.0_widescreen" id="{33BA54E2-E680-4402-BAC7-A8CA05C6BFDF}" vid="{8E72BE92-2C30-491B-91DF-C77D582CB58D}"/>
+      <thm15:themeFamily xmlns="" xmlns:thm15="http://schemas.microsoft.com/office/thememl/2012/main" name="Cerner_Template_3.0_widescreen" id="{33BA54E2-E680-4402-BAC7-A8CA05C6BFDF}" vid="{8E72BE92-2C30-491B-91DF-C77D582CB58D}"/>
     </a:ext>
   </a:extLst>
 </a:theme>
@@ -21294,7 +21318,7 @@
   <a:extraClrSchemeLst/>
   <a:extLst>
     <a:ext uri="{05A4C25C-085E-4340-85A3-A5531E510DB2}">
-      <thm15:themeFamily xmlns:thm15="http://schemas.microsoft.com/office/thememl/2012/main" xmlns="" name="Office Theme" id="{62F939B6-93AF-4DB8-9C6B-D6C7DFDC589F}" vid="{4A3C46E8-61CC-4603-A589-7422A47A8E4A}"/>
+      <thm15:themeFamily xmlns="" xmlns:thm15="http://schemas.microsoft.com/office/thememl/2012/main" name="Office Theme" id="{62F939B6-93AF-4DB8-9C6B-D6C7DFDC589F}" vid="{4A3C46E8-61CC-4603-A589-7422A47A8E4A}"/>
     </a:ext>
   </a:extLst>
 </a:theme>
@@ -21555,7 +21579,7 @@
   <a:extraClrSchemeLst/>
   <a:extLst>
     <a:ext uri="{05A4C25C-085E-4340-85A3-A5531E510DB2}">
-      <thm15:themeFamily xmlns:thm15="http://schemas.microsoft.com/office/thememl/2012/main" xmlns="" name="Office Theme" id="{62F939B6-93AF-4DB8-9C6B-D6C7DFDC589F}" vid="{4A3C46E8-61CC-4603-A589-7422A47A8E4A}"/>
+      <thm15:themeFamily xmlns="" xmlns:thm15="http://schemas.microsoft.com/office/thememl/2012/main" name="Office Theme" id="{62F939B6-93AF-4DB8-9C6B-D6C7DFDC589F}" vid="{4A3C46E8-61CC-4603-A589-7422A47A8E4A}"/>
     </a:ext>
   </a:extLst>
 </a:theme>

</xml_diff>